<commit_message>
Deployed 5aedaa6 with MkDocs version: 1.4.2
</commit_message>
<xml_diff>
--- a/public/drawings.pptx
+++ b/public/drawings.pptx
@@ -5,11 +5,12 @@
     <p:sldMasterId id="2147483648" r:id="rId1"/>
   </p:sldMasterIdLst>
   <p:notesMasterIdLst>
-    <p:notesMasterId r:id="rId4"/>
+    <p:notesMasterId r:id="rId5"/>
   </p:notesMasterIdLst>
   <p:sldIdLst>
     <p:sldId id="257" r:id="rId2"/>
     <p:sldId id="258" r:id="rId3"/>
+    <p:sldId id="338" r:id="rId4"/>
   </p:sldIdLst>
   <p:sldSz cx="12192000" cy="6858000"/>
   <p:notesSz cx="6858000" cy="9144000"/>
@@ -6619,6 +6620,971 @@
 </p:sld>
 </file>
 
+<file path=ppt/slides/slide3.xml><?xml version="1.0" encoding="utf-8"?>
+<p:sld xmlns:a="http://schemas.openxmlformats.org/drawingml/2006/main" xmlns:r="http://schemas.openxmlformats.org/officeDocument/2006/relationships" xmlns:p="http://schemas.openxmlformats.org/presentationml/2006/main">
+  <p:cSld>
+    <p:spTree>
+      <p:nvGrpSpPr>
+        <p:cNvPr id="1" name=""/>
+        <p:cNvGrpSpPr/>
+        <p:nvPr/>
+      </p:nvGrpSpPr>
+      <p:grpSpPr>
+        <a:xfrm>
+          <a:off x="0" y="0"/>
+          <a:ext cx="0" cy="0"/>
+          <a:chOff x="0" y="0"/>
+          <a:chExt cx="0" cy="0"/>
+        </a:xfrm>
+      </p:grpSpPr>
+      <p:grpSp>
+        <p:nvGrpSpPr>
+          <p:cNvPr id="19" name="Group 18">
+            <a:extLst>
+              <a:ext uri="{FF2B5EF4-FFF2-40B4-BE49-F238E27FC236}">
+                <a16:creationId xmlns:a16="http://schemas.microsoft.com/office/drawing/2014/main" id="{9ADE262E-959D-9783-FA41-10BC9B1D484A}"/>
+              </a:ext>
+            </a:extLst>
+          </p:cNvPr>
+          <p:cNvGrpSpPr/>
+          <p:nvPr/>
+        </p:nvGrpSpPr>
+        <p:grpSpPr>
+          <a:xfrm>
+            <a:off x="2418493" y="2154342"/>
+            <a:ext cx="5991078" cy="3650922"/>
+            <a:chOff x="2418493" y="2154342"/>
+            <a:chExt cx="5991078" cy="3650922"/>
+          </a:xfrm>
+        </p:grpSpPr>
+        <p:grpSp>
+          <p:nvGrpSpPr>
+            <p:cNvPr id="9" name="Group 8">
+              <a:extLst>
+                <a:ext uri="{FF2B5EF4-FFF2-40B4-BE49-F238E27FC236}">
+                  <a16:creationId xmlns:a16="http://schemas.microsoft.com/office/drawing/2014/main" id="{F55556D6-4C52-06C4-1B0E-D6D8E8907C35}"/>
+                </a:ext>
+              </a:extLst>
+            </p:cNvPr>
+            <p:cNvGrpSpPr/>
+            <p:nvPr/>
+          </p:nvGrpSpPr>
+          <p:grpSpPr>
+            <a:xfrm>
+              <a:off x="2418493" y="2154342"/>
+              <a:ext cx="5991078" cy="3650922"/>
+              <a:chOff x="2418493" y="2154342"/>
+              <a:chExt cx="5991078" cy="3650922"/>
+            </a:xfrm>
+          </p:grpSpPr>
+          <p:cxnSp>
+            <p:nvCxnSpPr>
+              <p:cNvPr id="5" name="Straight Arrow Connector 4"/>
+              <p:cNvCxnSpPr/>
+              <p:nvPr/>
+            </p:nvCxnSpPr>
+            <p:spPr bwMode="auto">
+              <a:xfrm>
+                <a:off x="2988459" y="5394702"/>
+                <a:ext cx="5040560" cy="0"/>
+              </a:xfrm>
+              <a:prstGeom prst="straightConnector1">
+                <a:avLst/>
+              </a:prstGeom>
+              <a:solidFill>
+                <a:schemeClr val="accent1"/>
+              </a:solidFill>
+              <a:ln w="19050" cap="flat" cmpd="sng" algn="ctr">
+                <a:solidFill>
+                  <a:srgbClr val="003D62"/>
+                </a:solidFill>
+                <a:prstDash val="solid"/>
+                <a:round/>
+                <a:headEnd type="none" w="med" len="med"/>
+                <a:tailEnd type="triangle" w="lg" len="lg"/>
+              </a:ln>
+              <a:effectLst/>
+              <a:extLst>
+                <a:ext uri="{AF507438-7753-43e0-B8FC-AC1667EBCBE1}">
+                  <a14:hiddenEffects xmlns:a14="http://schemas.microsoft.com/office/drawing/2010/main" xmlns="">
+                    <a:effectLst>
+                      <a:outerShdw blurRad="63500" dist="38099" dir="2700000" algn="ctr" rotWithShape="0">
+                        <a:schemeClr val="bg2">
+                          <a:alpha val="74998"/>
+                        </a:schemeClr>
+                      </a:outerShdw>
+                    </a:effectLst>
+                  </a14:hiddenEffects>
+                </a:ext>
+              </a:extLst>
+            </p:spPr>
+          </p:cxnSp>
+          <p:cxnSp>
+            <p:nvCxnSpPr>
+              <p:cNvPr id="6" name="Straight Arrow Connector 5"/>
+              <p:cNvCxnSpPr/>
+              <p:nvPr/>
+            </p:nvCxnSpPr>
+            <p:spPr bwMode="auto">
+              <a:xfrm flipV="1">
+                <a:off x="2988459" y="2154342"/>
+                <a:ext cx="0" cy="3240360"/>
+              </a:xfrm>
+              <a:prstGeom prst="straightConnector1">
+                <a:avLst/>
+              </a:prstGeom>
+              <a:solidFill>
+                <a:schemeClr val="accent1"/>
+              </a:solidFill>
+              <a:ln w="19050" cap="flat" cmpd="sng" algn="ctr">
+                <a:solidFill>
+                  <a:srgbClr val="003D62"/>
+                </a:solidFill>
+                <a:prstDash val="solid"/>
+                <a:round/>
+                <a:headEnd type="none" w="med" len="med"/>
+                <a:tailEnd type="triangle" w="lg" len="lg"/>
+              </a:ln>
+              <a:effectLst/>
+              <a:extLst>
+                <a:ext uri="{AF507438-7753-43e0-B8FC-AC1667EBCBE1}">
+                  <a14:hiddenEffects xmlns:a14="http://schemas.microsoft.com/office/drawing/2010/main" xmlns="">
+                    <a:effectLst>
+                      <a:outerShdw blurRad="63500" dist="38099" dir="2700000" algn="ctr" rotWithShape="0">
+                        <a:schemeClr val="bg2">
+                          <a:alpha val="74998"/>
+                        </a:schemeClr>
+                      </a:outerShdw>
+                    </a:effectLst>
+                  </a14:hiddenEffects>
+                </a:ext>
+              </a:extLst>
+            </p:spPr>
+          </p:cxnSp>
+          <p:cxnSp>
+            <p:nvCxnSpPr>
+              <p:cNvPr id="11" name="Straight Arrow Connector 10"/>
+              <p:cNvCxnSpPr/>
+              <p:nvPr/>
+            </p:nvCxnSpPr>
+            <p:spPr bwMode="auto">
+              <a:xfrm flipV="1">
+                <a:off x="2988459" y="2874422"/>
+                <a:ext cx="2304256" cy="2520280"/>
+              </a:xfrm>
+              <a:prstGeom prst="straightConnector1">
+                <a:avLst/>
+              </a:prstGeom>
+              <a:solidFill>
+                <a:schemeClr val="accent1"/>
+              </a:solidFill>
+              <a:ln w="19050" cap="flat" cmpd="sng" algn="ctr">
+                <a:solidFill>
+                  <a:srgbClr val="7E002F"/>
+                </a:solidFill>
+                <a:prstDash val="solid"/>
+                <a:round/>
+                <a:headEnd type="none" w="med" len="med"/>
+                <a:tailEnd type="none" w="lg" len="lg"/>
+              </a:ln>
+              <a:effectLst/>
+              <a:extLst>
+                <a:ext uri="{AF507438-7753-43e0-B8FC-AC1667EBCBE1}">
+                  <a14:hiddenEffects xmlns:a14="http://schemas.microsoft.com/office/drawing/2010/main" xmlns="">
+                    <a:effectLst>
+                      <a:outerShdw blurRad="63500" dist="38099" dir="2700000" algn="ctr" rotWithShape="0">
+                        <a:schemeClr val="bg2">
+                          <a:alpha val="74998"/>
+                        </a:schemeClr>
+                      </a:outerShdw>
+                    </a:effectLst>
+                  </a14:hiddenEffects>
+                </a:ext>
+              </a:extLst>
+            </p:spPr>
+          </p:cxnSp>
+          <p:cxnSp>
+            <p:nvCxnSpPr>
+              <p:cNvPr id="12" name="Straight Arrow Connector 11"/>
+              <p:cNvCxnSpPr/>
+              <p:nvPr/>
+            </p:nvCxnSpPr>
+            <p:spPr bwMode="auto">
+              <a:xfrm>
+                <a:off x="5292715" y="2874422"/>
+                <a:ext cx="2664296" cy="0"/>
+              </a:xfrm>
+              <a:prstGeom prst="straightConnector1">
+                <a:avLst/>
+              </a:prstGeom>
+              <a:solidFill>
+                <a:schemeClr val="accent1"/>
+              </a:solidFill>
+              <a:ln w="19050" cap="flat" cmpd="sng" algn="ctr">
+                <a:solidFill>
+                  <a:srgbClr val="7E002F"/>
+                </a:solidFill>
+                <a:prstDash val="solid"/>
+                <a:round/>
+                <a:headEnd type="none" w="med" len="med"/>
+                <a:tailEnd type="none" w="lg" len="lg"/>
+              </a:ln>
+              <a:effectLst/>
+              <a:extLst>
+                <a:ext uri="{AF507438-7753-43e0-B8FC-AC1667EBCBE1}">
+                  <a14:hiddenEffects xmlns:a14="http://schemas.microsoft.com/office/drawing/2010/main" xmlns="">
+                    <a:effectLst>
+                      <a:outerShdw blurRad="63500" dist="38099" dir="2700000" algn="ctr" rotWithShape="0">
+                        <a:schemeClr val="bg2">
+                          <a:alpha val="74998"/>
+                        </a:schemeClr>
+                      </a:outerShdw>
+                    </a:effectLst>
+                  </a14:hiddenEffects>
+                </a:ext>
+              </a:extLst>
+            </p:spPr>
+          </p:cxnSp>
+          <mc:AlternateContent xmlns:mc="http://schemas.openxmlformats.org/markup-compatibility/2006">
+            <mc:Choice xmlns:a14="http://schemas.microsoft.com/office/drawing/2010/main" Requires="a14">
+              <p:sp>
+                <p:nvSpPr>
+                  <p:cNvPr id="16" name="TextBox 15"/>
+                  <p:cNvSpPr txBox="1"/>
+                  <p:nvPr/>
+                </p:nvSpPr>
+                <p:spPr>
+                  <a:xfrm>
+                    <a:off x="4295801" y="5466710"/>
+                    <a:ext cx="2979277" cy="338554"/>
+                  </a:xfrm>
+                  <a:prstGeom prst="rect">
+                    <a:avLst/>
+                  </a:prstGeom>
+                  <a:noFill/>
+                </p:spPr>
+                <p:txBody>
+                  <a:bodyPr wrap="none" rtlCol="0">
+                    <a:spAutoFit/>
+                  </a:bodyPr>
+                  <a:lstStyle/>
+                  <a:p>
+                    <a:r>
+                      <a:rPr lang="en-US" sz="1600" dirty="0">
+                        <a:solidFill>
+                          <a:srgbClr val="003D62"/>
+                        </a:solidFill>
+                        <a:latin typeface="+mj-lt"/>
+                      </a:rPr>
+                      <a:t>Computational intensity (</a:t>
+                    </a:r>
+                    <a14:m>
+                      <m:oMath xmlns:m="http://schemas.openxmlformats.org/officeDocument/2006/math">
+                        <m:sSub>
+                          <m:sSubPr>
+                            <m:ctrlPr>
+                              <a:rPr lang="en-US" sz="1600" i="1" smtClean="0">
+                                <a:solidFill>
+                                  <a:srgbClr val="003D62"/>
+                                </a:solidFill>
+                                <a:latin typeface="Cambria Math" panose="02040503050406030204" pitchFamily="18" charset="0"/>
+                              </a:rPr>
+                            </m:ctrlPr>
+                          </m:sSubPr>
+                          <m:e>
+                            <m:r>
+                              <a:rPr lang="en-US" sz="1600" b="0" i="1" smtClean="0">
+                                <a:solidFill>
+                                  <a:srgbClr val="003D62"/>
+                                </a:solidFill>
+                                <a:latin typeface="Cambria Math" panose="02040503050406030204" pitchFamily="18" charset="0"/>
+                              </a:rPr>
+                              <m:t>𝑖</m:t>
+                            </m:r>
+                          </m:e>
+                          <m:sub>
+                            <m:r>
+                              <a:rPr lang="en-US" sz="1600" b="0" i="1" smtClean="0">
+                                <a:solidFill>
+                                  <a:srgbClr val="003D62"/>
+                                </a:solidFill>
+                                <a:latin typeface="Cambria Math" panose="02040503050406030204" pitchFamily="18" charset="0"/>
+                              </a:rPr>
+                              <m:t>𝑐</m:t>
+                            </m:r>
+                          </m:sub>
+                        </m:sSub>
+                      </m:oMath>
+                    </a14:m>
+                    <a:r>
+                      <a:rPr lang="en-US" sz="1600" dirty="0">
+                        <a:solidFill>
+                          <a:srgbClr val="003D62"/>
+                        </a:solidFill>
+                        <a:latin typeface="+mj-lt"/>
+                      </a:rPr>
+                      <a:t>) [F/B]</a:t>
+                    </a:r>
+                  </a:p>
+                </p:txBody>
+              </p:sp>
+            </mc:Choice>
+            <mc:Fallback>
+              <p:sp>
+                <p:nvSpPr>
+                  <p:cNvPr id="16" name="TextBox 15"/>
+                  <p:cNvSpPr txBox="1">
+                    <a:spLocks noRot="1" noChangeAspect="1" noMove="1" noResize="1" noEditPoints="1" noAdjustHandles="1" noChangeArrowheads="1" noChangeShapeType="1" noTextEdit="1"/>
+                  </p:cNvSpPr>
+                  <p:nvPr/>
+                </p:nvSpPr>
+                <p:spPr>
+                  <a:xfrm>
+                    <a:off x="4295801" y="5466710"/>
+                    <a:ext cx="2979277" cy="338554"/>
+                  </a:xfrm>
+                  <a:prstGeom prst="rect">
+                    <a:avLst/>
+                  </a:prstGeom>
+                  <a:blipFill>
+                    <a:blip r:embed="rId2"/>
+                    <a:stretch>
+                      <a:fillRect l="-1277" t="-3704" b="-22222"/>
+                    </a:stretch>
+                  </a:blipFill>
+                </p:spPr>
+                <p:txBody>
+                  <a:bodyPr/>
+                  <a:lstStyle/>
+                  <a:p>
+                    <a:r>
+                      <a:rPr lang="en-GB">
+                        <a:noFill/>
+                      </a:rPr>
+                      <a:t> </a:t>
+                    </a:r>
+                  </a:p>
+                </p:txBody>
+              </p:sp>
+            </mc:Fallback>
+          </mc:AlternateContent>
+          <p:sp>
+            <p:nvSpPr>
+              <p:cNvPr id="17" name="TextBox 16"/>
+              <p:cNvSpPr txBox="1"/>
+              <p:nvPr/>
+            </p:nvSpPr>
+            <p:spPr>
+              <a:xfrm rot="16200000">
+                <a:off x="1685055" y="3615115"/>
+                <a:ext cx="1836208" cy="369332"/>
+              </a:xfrm>
+              <a:prstGeom prst="rect">
+                <a:avLst/>
+              </a:prstGeom>
+              <a:noFill/>
+            </p:spPr>
+            <p:txBody>
+              <a:bodyPr wrap="none" rtlCol="0">
+                <a:spAutoFit/>
+              </a:bodyPr>
+              <a:lstStyle/>
+              <a:p>
+                <a:r>
+                  <a:rPr lang="en-US" dirty="0">
+                    <a:solidFill>
+                      <a:srgbClr val="003D62"/>
+                    </a:solidFill>
+                    <a:latin typeface="+mj-lt"/>
+                  </a:rPr>
+                  <a:t>Performance [F/s]</a:t>
+                </a:r>
+              </a:p>
+            </p:txBody>
+          </p:sp>
+          <mc:AlternateContent xmlns:mc="http://schemas.openxmlformats.org/markup-compatibility/2006">
+            <mc:Choice xmlns:a14="http://schemas.microsoft.com/office/drawing/2010/main" Requires="a14">
+              <p:sp>
+                <p:nvSpPr>
+                  <p:cNvPr id="20" name="TextBox 19"/>
+                  <p:cNvSpPr txBox="1"/>
+                  <p:nvPr/>
+                </p:nvSpPr>
+                <p:spPr>
+                  <a:xfrm rot="18753246">
+                    <a:off x="3781423" y="3591584"/>
+                    <a:ext cx="571375" cy="338554"/>
+                  </a:xfrm>
+                  <a:prstGeom prst="rect">
+                    <a:avLst/>
+                  </a:prstGeom>
+                  <a:noFill/>
+                </p:spPr>
+                <p:txBody>
+                  <a:bodyPr wrap="none" rtlCol="0">
+                    <a:spAutoFit/>
+                  </a:bodyPr>
+                  <a:lstStyle/>
+                  <a:p>
+                    <a14:m>
+                      <m:oMathPara xmlns:m="http://schemas.openxmlformats.org/officeDocument/2006/math">
+                        <m:oMathParaPr>
+                          <m:jc m:val="centerGroup"/>
+                        </m:oMathParaPr>
+                        <m:oMath xmlns:m="http://schemas.openxmlformats.org/officeDocument/2006/math">
+                          <m:r>
+                            <a:rPr lang="en-US" sz="1600" b="0" i="1" smtClean="0">
+                              <a:solidFill>
+                                <a:srgbClr val="7E002F"/>
+                              </a:solidFill>
+                              <a:latin typeface="Cambria Math" panose="02040503050406030204" pitchFamily="18" charset="0"/>
+                            </a:rPr>
+                            <m:t>𝐵</m:t>
+                          </m:r>
+                          <m:r>
+                            <a:rPr lang="en-US" sz="1600" b="0" i="1" smtClean="0">
+                              <a:solidFill>
+                                <a:srgbClr val="7E002F"/>
+                              </a:solidFill>
+                              <a:latin typeface="Cambria Math" panose="02040503050406030204" pitchFamily="18" charset="0"/>
+                            </a:rPr>
+                            <m:t> </m:t>
+                          </m:r>
+                          <m:sSub>
+                            <m:sSubPr>
+                              <m:ctrlPr>
+                                <a:rPr lang="en-US" sz="1600" b="0" i="1" smtClean="0">
+                                  <a:solidFill>
+                                    <a:srgbClr val="7E002F"/>
+                                  </a:solidFill>
+                                  <a:latin typeface="Cambria Math" panose="02040503050406030204" pitchFamily="18" charset="0"/>
+                                </a:rPr>
+                              </m:ctrlPr>
+                            </m:sSubPr>
+                            <m:e>
+                              <m:r>
+                                <a:rPr lang="en-US" sz="1600" b="0" i="1" smtClean="0">
+                                  <a:solidFill>
+                                    <a:srgbClr val="7E002F"/>
+                                  </a:solidFill>
+                                  <a:latin typeface="Cambria Math" panose="02040503050406030204" pitchFamily="18" charset="0"/>
+                                </a:rPr>
+                                <m:t>𝐼</m:t>
+                              </m:r>
+                            </m:e>
+                            <m:sub>
+                              <m:r>
+                                <a:rPr lang="en-US" sz="1600" b="0" i="1" smtClean="0">
+                                  <a:solidFill>
+                                    <a:srgbClr val="7E002F"/>
+                                  </a:solidFill>
+                                  <a:latin typeface="Cambria Math" panose="02040503050406030204" pitchFamily="18" charset="0"/>
+                                </a:rPr>
+                                <m:t>𝑐</m:t>
+                              </m:r>
+                            </m:sub>
+                          </m:sSub>
+                        </m:oMath>
+                      </m:oMathPara>
+                    </a14:m>
+                    <a:endParaRPr lang="en-US" sz="1600" b="0" dirty="0">
+                      <a:solidFill>
+                        <a:srgbClr val="7E002F"/>
+                      </a:solidFill>
+                    </a:endParaRPr>
+                  </a:p>
+                </p:txBody>
+              </p:sp>
+            </mc:Choice>
+            <mc:Fallback>
+              <p:sp>
+                <p:nvSpPr>
+                  <p:cNvPr id="20" name="TextBox 19"/>
+                  <p:cNvSpPr txBox="1">
+                    <a:spLocks noRot="1" noChangeAspect="1" noMove="1" noResize="1" noEditPoints="1" noAdjustHandles="1" noChangeArrowheads="1" noChangeShapeType="1" noTextEdit="1"/>
+                  </p:cNvSpPr>
+                  <p:nvPr/>
+                </p:nvSpPr>
+                <p:spPr>
+                  <a:xfrm rot="18753246">
+                    <a:off x="3781423" y="3591584"/>
+                    <a:ext cx="571375" cy="338554"/>
+                  </a:xfrm>
+                  <a:prstGeom prst="rect">
+                    <a:avLst/>
+                  </a:prstGeom>
+                  <a:blipFill>
+                    <a:blip r:embed="rId3"/>
+                    <a:stretch>
+                      <a:fillRect/>
+                    </a:stretch>
+                  </a:blipFill>
+                </p:spPr>
+                <p:txBody>
+                  <a:bodyPr/>
+                  <a:lstStyle/>
+                  <a:p>
+                    <a:r>
+                      <a:rPr lang="en-GB">
+                        <a:noFill/>
+                      </a:rPr>
+                      <a:t> </a:t>
+                    </a:r>
+                  </a:p>
+                </p:txBody>
+              </p:sp>
+            </mc:Fallback>
+          </mc:AlternateContent>
+          <p:sp>
+            <p:nvSpPr>
+              <p:cNvPr id="24" name="TextBox 23"/>
+              <p:cNvSpPr txBox="1"/>
+              <p:nvPr/>
+            </p:nvSpPr>
+            <p:spPr>
+              <a:xfrm>
+                <a:off x="3434551" y="2401428"/>
+                <a:ext cx="4378763" cy="338554"/>
+              </a:xfrm>
+              <a:prstGeom prst="rect">
+                <a:avLst/>
+              </a:prstGeom>
+              <a:noFill/>
+            </p:spPr>
+            <p:txBody>
+              <a:bodyPr wrap="none" rtlCol="0">
+                <a:spAutoFit/>
+              </a:bodyPr>
+              <a:lstStyle/>
+              <a:p>
+                <a:r>
+                  <a:rPr lang="en-US" sz="1600" dirty="0">
+                    <a:solidFill>
+                      <a:srgbClr val="003D62"/>
+                    </a:solidFill>
+                    <a:latin typeface="+mj-lt"/>
+                  </a:rPr>
+                  <a:t>Bandwidth limited &lt;-|-&gt; peak performance limited </a:t>
+                </a:r>
+              </a:p>
+            </p:txBody>
+          </p:sp>
+          <p:cxnSp>
+            <p:nvCxnSpPr>
+              <p:cNvPr id="28" name="Straight Arrow Connector 27"/>
+              <p:cNvCxnSpPr/>
+              <p:nvPr/>
+            </p:nvCxnSpPr>
+            <p:spPr bwMode="auto">
+              <a:xfrm>
+                <a:off x="2999656" y="2874422"/>
+                <a:ext cx="2304256" cy="0"/>
+              </a:xfrm>
+              <a:prstGeom prst="straightConnector1">
+                <a:avLst/>
+              </a:prstGeom>
+              <a:solidFill>
+                <a:schemeClr val="accent1"/>
+              </a:solidFill>
+              <a:ln w="19050" cap="flat" cmpd="sng" algn="ctr">
+                <a:solidFill>
+                  <a:srgbClr val="7E002F"/>
+                </a:solidFill>
+                <a:prstDash val="dash"/>
+                <a:round/>
+                <a:headEnd type="none" w="med" len="med"/>
+                <a:tailEnd type="none" w="lg" len="lg"/>
+              </a:ln>
+              <a:effectLst/>
+              <a:extLst>
+                <a:ext uri="{AF507438-7753-43e0-B8FC-AC1667EBCBE1}">
+                  <a14:hiddenEffects xmlns:a14="http://schemas.microsoft.com/office/drawing/2010/main" xmlns="">
+                    <a:effectLst>
+                      <a:outerShdw blurRad="63500" dist="38099" dir="2700000" algn="ctr" rotWithShape="0">
+                        <a:schemeClr val="bg2">
+                          <a:alpha val="74998"/>
+                        </a:schemeClr>
+                      </a:outerShdw>
+                    </a:effectLst>
+                  </a14:hiddenEffects>
+                </a:ext>
+              </a:extLst>
+            </p:spPr>
+          </p:cxnSp>
+          <mc:AlternateContent xmlns:mc="http://schemas.openxmlformats.org/markup-compatibility/2006">
+            <mc:Choice xmlns:a14="http://schemas.microsoft.com/office/drawing/2010/main" Requires="a14">
+              <p:sp>
+                <p:nvSpPr>
+                  <p:cNvPr id="8" name="TextBox 7">
+                    <a:extLst>
+                      <a:ext uri="{FF2B5EF4-FFF2-40B4-BE49-F238E27FC236}">
+                        <a16:creationId xmlns:a16="http://schemas.microsoft.com/office/drawing/2014/main" id="{07953C7D-A754-EB4B-25CE-995993A86598}"/>
+                      </a:ext>
+                    </a:extLst>
+                  </p:cNvPr>
+                  <p:cNvSpPr txBox="1"/>
+                  <p:nvPr/>
+                </p:nvSpPr>
+                <p:spPr>
+                  <a:xfrm>
+                    <a:off x="7957011" y="2679048"/>
+                    <a:ext cx="452560" cy="390748"/>
+                  </a:xfrm>
+                  <a:prstGeom prst="rect">
+                    <a:avLst/>
+                  </a:prstGeom>
+                  <a:noFill/>
+                </p:spPr>
+                <p:txBody>
+                  <a:bodyPr wrap="none" rtlCol="0">
+                    <a:spAutoFit/>
+                  </a:bodyPr>
+                  <a:lstStyle/>
+                  <a:p>
+                    <a14:m>
+                      <m:oMathPara xmlns:m="http://schemas.openxmlformats.org/officeDocument/2006/math">
+                        <m:oMathParaPr>
+                          <m:jc m:val="centerGroup"/>
+                        </m:oMathParaPr>
+                        <m:oMath xmlns:m="http://schemas.openxmlformats.org/officeDocument/2006/math">
+                          <m:sSub>
+                            <m:sSubPr>
+                              <m:ctrlPr>
+                                <a:rPr lang="en-US" b="0" i="1" smtClean="0">
+                                  <a:solidFill>
+                                    <a:srgbClr val="C00000"/>
+                                  </a:solidFill>
+                                  <a:latin typeface="Cambria Math" panose="02040503050406030204" pitchFamily="18" charset="0"/>
+                                </a:rPr>
+                              </m:ctrlPr>
+                            </m:sSubPr>
+                            <m:e>
+                              <m:r>
+                                <a:rPr lang="en-US" b="0" i="1" smtClean="0">
+                                  <a:solidFill>
+                                    <a:srgbClr val="C00000"/>
+                                  </a:solidFill>
+                                  <a:latin typeface="Cambria Math" panose="02040503050406030204" pitchFamily="18" charset="0"/>
+                                </a:rPr>
+                                <m:t>𝑃</m:t>
+                              </m:r>
+                            </m:e>
+                            <m:sub>
+                              <m:r>
+                                <a:rPr lang="en-US" b="0" i="1" smtClean="0">
+                                  <a:solidFill>
+                                    <a:srgbClr val="C00000"/>
+                                  </a:solidFill>
+                                  <a:latin typeface="Cambria Math" panose="02040503050406030204" pitchFamily="18" charset="0"/>
+                                </a:rPr>
+                                <m:t>𝑝</m:t>
+                              </m:r>
+                            </m:sub>
+                          </m:sSub>
+                        </m:oMath>
+                      </m:oMathPara>
+                    </a14:m>
+                    <a:endParaRPr lang="en-GB" dirty="0">
+                      <a:solidFill>
+                        <a:srgbClr val="C00000"/>
+                      </a:solidFill>
+                    </a:endParaRPr>
+                  </a:p>
+                </p:txBody>
+              </p:sp>
+            </mc:Choice>
+            <mc:Fallback>
+              <p:sp>
+                <p:nvSpPr>
+                  <p:cNvPr id="8" name="TextBox 7">
+                    <a:extLst>
+                      <a:ext uri="{FF2B5EF4-FFF2-40B4-BE49-F238E27FC236}">
+                        <a16:creationId xmlns:a16="http://schemas.microsoft.com/office/drawing/2014/main" id="{07953C7D-A754-EB4B-25CE-995993A86598}"/>
+                      </a:ext>
+                    </a:extLst>
+                  </p:cNvPr>
+                  <p:cNvSpPr txBox="1">
+                    <a:spLocks noRot="1" noChangeAspect="1" noMove="1" noResize="1" noEditPoints="1" noAdjustHandles="1" noChangeArrowheads="1" noChangeShapeType="1" noTextEdit="1"/>
+                  </p:cNvSpPr>
+                  <p:nvPr/>
+                </p:nvSpPr>
+                <p:spPr>
+                  <a:xfrm>
+                    <a:off x="7957011" y="2679048"/>
+                    <a:ext cx="452560" cy="390748"/>
+                  </a:xfrm>
+                  <a:prstGeom prst="rect">
+                    <a:avLst/>
+                  </a:prstGeom>
+                  <a:blipFill>
+                    <a:blip r:embed="rId4"/>
+                    <a:stretch>
+                      <a:fillRect b="-3125"/>
+                    </a:stretch>
+                  </a:blipFill>
+                </p:spPr>
+                <p:txBody>
+                  <a:bodyPr/>
+                  <a:lstStyle/>
+                  <a:p>
+                    <a:r>
+                      <a:rPr lang="en-GB">
+                        <a:noFill/>
+                      </a:rPr>
+                      <a:t> </a:t>
+                    </a:r>
+                  </a:p>
+                </p:txBody>
+              </p:sp>
+            </mc:Fallback>
+          </mc:AlternateContent>
+        </p:grpSp>
+        <p:sp>
+          <p:nvSpPr>
+            <p:cNvPr id="10" name="Oval 9">
+              <a:extLst>
+                <a:ext uri="{FF2B5EF4-FFF2-40B4-BE49-F238E27FC236}">
+                  <a16:creationId xmlns:a16="http://schemas.microsoft.com/office/drawing/2014/main" id="{DAD41C12-EF12-1477-DFFB-6E0655069BF2}"/>
+                </a:ext>
+              </a:extLst>
+            </p:cNvPr>
+            <p:cNvSpPr>
+              <a:spLocks noChangeAspect="1"/>
+            </p:cNvSpPr>
+            <p:nvPr/>
+          </p:nvSpPr>
+          <p:spPr>
+            <a:xfrm>
+              <a:off x="4516243" y="4092861"/>
+              <a:ext cx="278777" cy="278777"/>
+            </a:xfrm>
+            <a:prstGeom prst="ellipse">
+              <a:avLst/>
+            </a:prstGeom>
+            <a:ln w="25400">
+              <a:solidFill>
+                <a:srgbClr val="FF0000"/>
+              </a:solidFill>
+            </a:ln>
+          </p:spPr>
+          <p:style>
+            <a:lnRef idx="2">
+              <a:schemeClr val="accent6"/>
+            </a:lnRef>
+            <a:fillRef idx="1">
+              <a:schemeClr val="lt1"/>
+            </a:fillRef>
+            <a:effectRef idx="0">
+              <a:schemeClr val="accent6"/>
+            </a:effectRef>
+            <a:fontRef idx="minor">
+              <a:schemeClr val="dk1"/>
+            </a:fontRef>
+          </p:style>
+          <p:txBody>
+            <a:bodyPr rtlCol="0" anchor="ctr"/>
+            <a:lstStyle/>
+            <a:p>
+              <a:pPr algn="ctr"/>
+              <a:r>
+                <a:rPr lang="en-GB" dirty="0">
+                  <a:solidFill>
+                    <a:srgbClr val="FF0000"/>
+                  </a:solidFill>
+                </a:rPr>
+                <a:t>1</a:t>
+              </a:r>
+            </a:p>
+          </p:txBody>
+        </p:sp>
+        <p:sp>
+          <p:nvSpPr>
+            <p:cNvPr id="13" name="Oval 12">
+              <a:extLst>
+                <a:ext uri="{FF2B5EF4-FFF2-40B4-BE49-F238E27FC236}">
+                  <a16:creationId xmlns:a16="http://schemas.microsoft.com/office/drawing/2014/main" id="{30B79236-7D7B-6FB8-6773-E21336E3D26B}"/>
+                </a:ext>
+              </a:extLst>
+            </p:cNvPr>
+            <p:cNvSpPr>
+              <a:spLocks noChangeAspect="1"/>
+            </p:cNvSpPr>
+            <p:nvPr/>
+          </p:nvSpPr>
+          <p:spPr>
+            <a:xfrm>
+              <a:off x="6408231" y="3788062"/>
+              <a:ext cx="278777" cy="278777"/>
+            </a:xfrm>
+            <a:prstGeom prst="ellipse">
+              <a:avLst/>
+            </a:prstGeom>
+            <a:ln w="25400">
+              <a:solidFill>
+                <a:srgbClr val="FF0000"/>
+              </a:solidFill>
+            </a:ln>
+          </p:spPr>
+          <p:style>
+            <a:lnRef idx="2">
+              <a:schemeClr val="accent6"/>
+            </a:lnRef>
+            <a:fillRef idx="1">
+              <a:schemeClr val="lt1"/>
+            </a:fillRef>
+            <a:effectRef idx="0">
+              <a:schemeClr val="accent6"/>
+            </a:effectRef>
+            <a:fontRef idx="minor">
+              <a:schemeClr val="dk1"/>
+            </a:fontRef>
+          </p:style>
+          <p:txBody>
+            <a:bodyPr rtlCol="0" anchor="ctr"/>
+            <a:lstStyle/>
+            <a:p>
+              <a:pPr algn="ctr"/>
+              <a:r>
+                <a:rPr lang="en-GB" dirty="0">
+                  <a:solidFill>
+                    <a:srgbClr val="FF0000"/>
+                  </a:solidFill>
+                </a:rPr>
+                <a:t>2</a:t>
+              </a:r>
+            </a:p>
+          </p:txBody>
+        </p:sp>
+        <p:sp>
+          <p:nvSpPr>
+            <p:cNvPr id="14" name="Oval 13">
+              <a:extLst>
+                <a:ext uri="{FF2B5EF4-FFF2-40B4-BE49-F238E27FC236}">
+                  <a16:creationId xmlns:a16="http://schemas.microsoft.com/office/drawing/2014/main" id="{A374655F-E771-E798-A03D-72121174FBE9}"/>
+                </a:ext>
+              </a:extLst>
+            </p:cNvPr>
+            <p:cNvSpPr>
+              <a:spLocks noChangeAspect="1"/>
+            </p:cNvSpPr>
+            <p:nvPr/>
+          </p:nvSpPr>
+          <p:spPr>
+            <a:xfrm>
+              <a:off x="5181598" y="2829058"/>
+              <a:ext cx="278777" cy="278777"/>
+            </a:xfrm>
+            <a:prstGeom prst="ellipse">
+              <a:avLst/>
+            </a:prstGeom>
+            <a:ln w="25400">
+              <a:solidFill>
+                <a:srgbClr val="FF0000"/>
+              </a:solidFill>
+            </a:ln>
+          </p:spPr>
+          <p:style>
+            <a:lnRef idx="2">
+              <a:schemeClr val="accent6"/>
+            </a:lnRef>
+            <a:fillRef idx="1">
+              <a:schemeClr val="lt1"/>
+            </a:fillRef>
+            <a:effectRef idx="0">
+              <a:schemeClr val="accent6"/>
+            </a:effectRef>
+            <a:fontRef idx="minor">
+              <a:schemeClr val="dk1"/>
+            </a:fontRef>
+          </p:style>
+          <p:txBody>
+            <a:bodyPr rtlCol="0" anchor="ctr"/>
+            <a:lstStyle/>
+            <a:p>
+              <a:pPr algn="ctr"/>
+              <a:r>
+                <a:rPr lang="en-GB" dirty="0">
+                  <a:solidFill>
+                    <a:srgbClr val="FF0000"/>
+                  </a:solidFill>
+                </a:rPr>
+                <a:t>3</a:t>
+              </a:r>
+            </a:p>
+          </p:txBody>
+        </p:sp>
+        <p:sp>
+          <p:nvSpPr>
+            <p:cNvPr id="15" name="Oval 14">
+              <a:extLst>
+                <a:ext uri="{FF2B5EF4-FFF2-40B4-BE49-F238E27FC236}">
+                  <a16:creationId xmlns:a16="http://schemas.microsoft.com/office/drawing/2014/main" id="{F9A391E0-402A-607E-0473-EA3DE1ADE0C5}"/>
+                </a:ext>
+              </a:extLst>
+            </p:cNvPr>
+            <p:cNvSpPr>
+              <a:spLocks noChangeAspect="1"/>
+            </p:cNvSpPr>
+            <p:nvPr/>
+          </p:nvSpPr>
+          <p:spPr>
+            <a:xfrm>
+              <a:off x="7199965" y="2829056"/>
+              <a:ext cx="278777" cy="278777"/>
+            </a:xfrm>
+            <a:prstGeom prst="ellipse">
+              <a:avLst/>
+            </a:prstGeom>
+            <a:ln w="25400">
+              <a:solidFill>
+                <a:srgbClr val="FF0000"/>
+              </a:solidFill>
+            </a:ln>
+          </p:spPr>
+          <p:style>
+            <a:lnRef idx="2">
+              <a:schemeClr val="accent6"/>
+            </a:lnRef>
+            <a:fillRef idx="1">
+              <a:schemeClr val="lt1"/>
+            </a:fillRef>
+            <a:effectRef idx="0">
+              <a:schemeClr val="accent6"/>
+            </a:effectRef>
+            <a:fontRef idx="minor">
+              <a:schemeClr val="dk1"/>
+            </a:fontRef>
+          </p:style>
+          <p:txBody>
+            <a:bodyPr rtlCol="0" anchor="ctr"/>
+            <a:lstStyle/>
+            <a:p>
+              <a:pPr algn="ctr"/>
+              <a:r>
+                <a:rPr lang="en-GB" dirty="0">
+                  <a:solidFill>
+                    <a:srgbClr val="FF0000"/>
+                  </a:solidFill>
+                </a:rPr>
+                <a:t>4</a:t>
+              </a:r>
+            </a:p>
+          </p:txBody>
+        </p:sp>
+      </p:grpSp>
+    </p:spTree>
+    <p:extLst>
+      <p:ext uri="{BB962C8B-B14F-4D97-AF65-F5344CB8AC3E}">
+        <p14:creationId xmlns:p14="http://schemas.microsoft.com/office/powerpoint/2010/main" val="2209610087"/>
+      </p:ext>
+    </p:extLst>
+  </p:cSld>
+  <p:clrMapOvr>
+    <a:masterClrMapping/>
+  </p:clrMapOvr>
+</p:sld>
+</file>
+
 <file path=ppt/theme/theme1.xml><?xml version="1.0" encoding="utf-8"?>
 <a:theme xmlns:a="http://schemas.openxmlformats.org/drawingml/2006/main" name="Office Theme">
   <a:themeElements>

</xml_diff>

<commit_message>
Deployed c9228c9 with MkDocs version: 1.4.2
</commit_message>
<xml_diff>
--- a/public/drawings.pptx
+++ b/public/drawings.pptx
@@ -5,22 +5,23 @@
     <p:sldMasterId id="2147483648" r:id="rId1"/>
   </p:sldMasterIdLst>
   <p:notesMasterIdLst>
-    <p:notesMasterId r:id="rId15"/>
+    <p:notesMasterId r:id="rId16"/>
   </p:notesMasterIdLst>
   <p:sldIdLst>
     <p:sldId id="257" r:id="rId2"/>
-    <p:sldId id="258" r:id="rId3"/>
-    <p:sldId id="338" r:id="rId4"/>
-    <p:sldId id="339" r:id="rId5"/>
-    <p:sldId id="323" r:id="rId6"/>
-    <p:sldId id="318" r:id="rId7"/>
-    <p:sldId id="340" r:id="rId8"/>
-    <p:sldId id="341" r:id="rId9"/>
-    <p:sldId id="320" r:id="rId10"/>
-    <p:sldId id="342" r:id="rId11"/>
-    <p:sldId id="343" r:id="rId12"/>
-    <p:sldId id="344" r:id="rId13"/>
-    <p:sldId id="345" r:id="rId14"/>
+    <p:sldId id="346" r:id="rId3"/>
+    <p:sldId id="258" r:id="rId4"/>
+    <p:sldId id="338" r:id="rId5"/>
+    <p:sldId id="339" r:id="rId6"/>
+    <p:sldId id="323" r:id="rId7"/>
+    <p:sldId id="318" r:id="rId8"/>
+    <p:sldId id="340" r:id="rId9"/>
+    <p:sldId id="341" r:id="rId10"/>
+    <p:sldId id="320" r:id="rId11"/>
+    <p:sldId id="342" r:id="rId12"/>
+    <p:sldId id="343" r:id="rId13"/>
+    <p:sldId id="344" r:id="rId14"/>
+    <p:sldId id="345" r:id="rId15"/>
   </p:sldIdLst>
   <p:sldSz cx="12192000" cy="6858000"/>
   <p:notesSz cx="6858000" cy="9144000"/>
@@ -119,6 +120,11 @@
       </a:defRPr>
     </a:lvl9pPr>
   </p:defaultTextStyle>
+  <p:extLst>
+    <p:ext uri="{EFAFB233-063F-42B5-8137-9DF3F51BA10A}">
+      <p15:sldGuideLst xmlns:p15="http://schemas.microsoft.com/office/powerpoint/2012/main"/>
+    </p:ext>
+  </p:extLst>
 </p:presentation>
 </file>
 
@@ -204,7 +210,7 @@
           <a:p>
             <a:fld id="{1487A955-B0B6-BE46-BA79-863ECB8B9B7B}" type="datetimeFigureOut">
               <a:rPr lang="en-GB" smtClean="0"/>
-              <a:t>16/02/2023</a:t>
+              <a:t>06/03/2023</a:t>
             </a:fld>
             <a:endParaRPr lang="en-GB"/>
           </a:p>
@@ -536,7 +542,7 @@
           <a:p>
             <a:fld id="{D106152E-64A5-8445-9CF5-1963979597C7}" type="slidenum">
               <a:rPr lang="en-GB" smtClean="0"/>
-              <a:t>2</a:t>
+              <a:t>3</a:t>
             </a:fld>
             <a:endParaRPr lang="en-GB"/>
           </a:p>
@@ -702,7 +708,7 @@
           <a:p>
             <a:fld id="{0492CA4C-7333-E747-B517-6468D8AE026A}" type="datetimeFigureOut">
               <a:rPr lang="en-GB" smtClean="0"/>
-              <a:t>16/02/2023</a:t>
+              <a:t>06/03/2023</a:t>
             </a:fld>
             <a:endParaRPr lang="en-GB"/>
           </a:p>
@@ -900,7 +906,7 @@
           <a:p>
             <a:fld id="{0492CA4C-7333-E747-B517-6468D8AE026A}" type="datetimeFigureOut">
               <a:rPr lang="en-GB" smtClean="0"/>
-              <a:t>16/02/2023</a:t>
+              <a:t>06/03/2023</a:t>
             </a:fld>
             <a:endParaRPr lang="en-GB"/>
           </a:p>
@@ -1108,7 +1114,7 @@
           <a:p>
             <a:fld id="{0492CA4C-7333-E747-B517-6468D8AE026A}" type="datetimeFigureOut">
               <a:rPr lang="en-GB" smtClean="0"/>
-              <a:t>16/02/2023</a:t>
+              <a:t>06/03/2023</a:t>
             </a:fld>
             <a:endParaRPr lang="en-GB"/>
           </a:p>
@@ -1306,7 +1312,7 @@
           <a:p>
             <a:fld id="{0492CA4C-7333-E747-B517-6468D8AE026A}" type="datetimeFigureOut">
               <a:rPr lang="en-GB" smtClean="0"/>
-              <a:t>16/02/2023</a:t>
+              <a:t>06/03/2023</a:t>
             </a:fld>
             <a:endParaRPr lang="en-GB"/>
           </a:p>
@@ -1581,7 +1587,7 @@
           <a:p>
             <a:fld id="{0492CA4C-7333-E747-B517-6468D8AE026A}" type="datetimeFigureOut">
               <a:rPr lang="en-GB" smtClean="0"/>
-              <a:t>16/02/2023</a:t>
+              <a:t>06/03/2023</a:t>
             </a:fld>
             <a:endParaRPr lang="en-GB"/>
           </a:p>
@@ -1846,7 +1852,7 @@
           <a:p>
             <a:fld id="{0492CA4C-7333-E747-B517-6468D8AE026A}" type="datetimeFigureOut">
               <a:rPr lang="en-GB" smtClean="0"/>
-              <a:t>16/02/2023</a:t>
+              <a:t>06/03/2023</a:t>
             </a:fld>
             <a:endParaRPr lang="en-GB"/>
           </a:p>
@@ -2258,7 +2264,7 @@
           <a:p>
             <a:fld id="{0492CA4C-7333-E747-B517-6468D8AE026A}" type="datetimeFigureOut">
               <a:rPr lang="en-GB" smtClean="0"/>
-              <a:t>16/02/2023</a:t>
+              <a:t>06/03/2023</a:t>
             </a:fld>
             <a:endParaRPr lang="en-GB"/>
           </a:p>
@@ -2399,7 +2405,7 @@
           <a:p>
             <a:fld id="{0492CA4C-7333-E747-B517-6468D8AE026A}" type="datetimeFigureOut">
               <a:rPr lang="en-GB" smtClean="0"/>
-              <a:t>16/02/2023</a:t>
+              <a:t>06/03/2023</a:t>
             </a:fld>
             <a:endParaRPr lang="en-GB"/>
           </a:p>
@@ -2512,7 +2518,7 @@
           <a:p>
             <a:fld id="{0492CA4C-7333-E747-B517-6468D8AE026A}" type="datetimeFigureOut">
               <a:rPr lang="en-GB" smtClean="0"/>
-              <a:t>16/02/2023</a:t>
+              <a:t>06/03/2023</a:t>
             </a:fld>
             <a:endParaRPr lang="en-GB"/>
           </a:p>
@@ -2823,7 +2829,7 @@
           <a:p>
             <a:fld id="{0492CA4C-7333-E747-B517-6468D8AE026A}" type="datetimeFigureOut">
               <a:rPr lang="en-GB" smtClean="0"/>
-              <a:t>16/02/2023</a:t>
+              <a:t>06/03/2023</a:t>
             </a:fld>
             <a:endParaRPr lang="en-GB"/>
           </a:p>
@@ -3111,7 +3117,7 @@
           <a:p>
             <a:fld id="{0492CA4C-7333-E747-B517-6468D8AE026A}" type="datetimeFigureOut">
               <a:rPr lang="en-GB" smtClean="0"/>
-              <a:t>16/02/2023</a:t>
+              <a:t>06/03/2023</a:t>
             </a:fld>
             <a:endParaRPr lang="en-GB"/>
           </a:p>
@@ -3352,7 +3358,7 @@
           <a:p>
             <a:fld id="{0492CA4C-7333-E747-B517-6468D8AE026A}" type="datetimeFigureOut">
               <a:rPr lang="en-GB" smtClean="0"/>
-              <a:t>16/02/2023</a:t>
+              <a:t>06/03/2023</a:t>
             </a:fld>
             <a:endParaRPr lang="en-GB"/>
           </a:p>
@@ -4682,6 +4688,171 @@
 </file>
 
 <file path=ppt/slides/slide10.xml><?xml version="1.0" encoding="utf-8"?>
+<p:sld xmlns:a="http://schemas.openxmlformats.org/drawingml/2006/main" xmlns:r="http://schemas.openxmlformats.org/officeDocument/2006/relationships" xmlns:p="http://schemas.openxmlformats.org/presentationml/2006/main">
+  <p:cSld>
+    <p:spTree>
+      <p:nvGrpSpPr>
+        <p:cNvPr id="1" name=""/>
+        <p:cNvGrpSpPr/>
+        <p:nvPr/>
+      </p:nvGrpSpPr>
+      <p:grpSpPr>
+        <a:xfrm>
+          <a:off x="0" y="0"/>
+          <a:ext cx="0" cy="0"/>
+          <a:chOff x="0" y="0"/>
+          <a:chExt cx="0" cy="0"/>
+        </a:xfrm>
+      </p:grpSpPr>
+      <p:pic>
+        <p:nvPicPr>
+          <p:cNvPr id="9" name="Content Placeholder 4">
+            <a:extLst>
+              <a:ext uri="{FF2B5EF4-FFF2-40B4-BE49-F238E27FC236}">
+                <a16:creationId xmlns:a16="http://schemas.microsoft.com/office/drawing/2014/main" id="{425FDEC1-07CA-BF8A-A271-DC071567B813}"/>
+              </a:ext>
+            </a:extLst>
+          </p:cNvPr>
+          <p:cNvPicPr>
+            <a:picLocks noChangeAspect="1"/>
+          </p:cNvPicPr>
+          <p:nvPr/>
+        </p:nvPicPr>
+        <p:blipFill>
+          <a:blip r:embed="rId2"/>
+          <a:stretch>
+            <a:fillRect/>
+          </a:stretch>
+        </p:blipFill>
+        <p:spPr>
+          <a:xfrm>
+            <a:off x="354475" y="2003337"/>
+            <a:ext cx="8443913" cy="1513349"/>
+          </a:xfrm>
+          <a:prstGeom prst="rect">
+            <a:avLst/>
+          </a:prstGeom>
+        </p:spPr>
+      </p:pic>
+      <p:pic>
+        <p:nvPicPr>
+          <p:cNvPr id="10" name="Picture 9">
+            <a:extLst>
+              <a:ext uri="{FF2B5EF4-FFF2-40B4-BE49-F238E27FC236}">
+                <a16:creationId xmlns:a16="http://schemas.microsoft.com/office/drawing/2014/main" id="{1E5E64E8-776A-ECE5-6A99-7A0C8670546E}"/>
+              </a:ext>
+            </a:extLst>
+          </p:cNvPr>
+          <p:cNvPicPr>
+            <a:picLocks noChangeAspect="1"/>
+          </p:cNvPicPr>
+          <p:nvPr/>
+        </p:nvPicPr>
+        <p:blipFill>
+          <a:blip r:embed="rId3"/>
+          <a:stretch>
+            <a:fillRect/>
+          </a:stretch>
+        </p:blipFill>
+        <p:spPr>
+          <a:xfrm>
+            <a:off x="354475" y="3817441"/>
+            <a:ext cx="5224522" cy="1515756"/>
+          </a:xfrm>
+          <a:prstGeom prst="rect">
+            <a:avLst/>
+          </a:prstGeom>
+        </p:spPr>
+      </p:pic>
+    </p:spTree>
+    <p:extLst>
+      <p:ext uri="{BB962C8B-B14F-4D97-AF65-F5344CB8AC3E}">
+        <p14:creationId xmlns:p14="http://schemas.microsoft.com/office/powerpoint/2010/main" val="3383201513"/>
+      </p:ext>
+    </p:extLst>
+  </p:cSld>
+  <p:clrMapOvr>
+    <a:masterClrMapping/>
+  </p:clrMapOvr>
+  <p:timing>
+    <p:tnLst>
+      <p:par>
+        <p:cTn id="1" dur="indefinite" restart="never" nodeType="tmRoot">
+          <p:childTnLst>
+            <p:seq concurrent="1" nextAc="seek">
+              <p:cTn id="2" dur="indefinite" nodeType="mainSeq">
+                <p:childTnLst>
+                  <p:par>
+                    <p:cTn id="3" fill="hold">
+                      <p:stCondLst>
+                        <p:cond delay="indefinite"/>
+                      </p:stCondLst>
+                      <p:childTnLst>
+                        <p:par>
+                          <p:cTn id="4" fill="hold">
+                            <p:stCondLst>
+                              <p:cond delay="0"/>
+                            </p:stCondLst>
+                            <p:childTnLst>
+                              <p:par>
+                                <p:cTn id="5" presetID="1" presetClass="entr" presetSubtype="0" fill="hold" nodeType="clickEffect">
+                                  <p:stCondLst>
+                                    <p:cond delay="0"/>
+                                  </p:stCondLst>
+                                  <p:childTnLst>
+                                    <p:set>
+                                      <p:cBhvr>
+                                        <p:cTn id="6" dur="1" fill="hold">
+                                          <p:stCondLst>
+                                            <p:cond delay="0"/>
+                                          </p:stCondLst>
+                                        </p:cTn>
+                                        <p:tgtEl>
+                                          <p:spTgt spid="10"/>
+                                        </p:tgtEl>
+                                        <p:attrNameLst>
+                                          <p:attrName>style.visibility</p:attrName>
+                                        </p:attrNameLst>
+                                      </p:cBhvr>
+                                      <p:to>
+                                        <p:strVal val="visible"/>
+                                      </p:to>
+                                    </p:set>
+                                  </p:childTnLst>
+                                </p:cTn>
+                              </p:par>
+                            </p:childTnLst>
+                          </p:cTn>
+                        </p:par>
+                      </p:childTnLst>
+                    </p:cTn>
+                  </p:par>
+                </p:childTnLst>
+              </p:cTn>
+              <p:prevCondLst>
+                <p:cond evt="onPrev" delay="0">
+                  <p:tgtEl>
+                    <p:sldTgt/>
+                  </p:tgtEl>
+                </p:cond>
+              </p:prevCondLst>
+              <p:nextCondLst>
+                <p:cond evt="onNext" delay="0">
+                  <p:tgtEl>
+                    <p:sldTgt/>
+                  </p:tgtEl>
+                </p:cond>
+              </p:nextCondLst>
+            </p:seq>
+          </p:childTnLst>
+        </p:cTn>
+      </p:par>
+    </p:tnLst>
+  </p:timing>
+</p:sld>
+</file>
+
+<file path=ppt/slides/slide11.xml><?xml version="1.0" encoding="utf-8"?>
 <p:sld xmlns:a="http://schemas.openxmlformats.org/drawingml/2006/main" xmlns:r="http://schemas.openxmlformats.org/officeDocument/2006/relationships" xmlns:p="http://schemas.openxmlformats.org/presentationml/2006/main">
   <p:cSld>
     <p:spTree>
@@ -5657,7 +5828,7 @@
 </p:sld>
 </file>
 
-<file path=ppt/slides/slide11.xml><?xml version="1.0" encoding="utf-8"?>
+<file path=ppt/slides/slide12.xml><?xml version="1.0" encoding="utf-8"?>
 <p:sld xmlns:a="http://schemas.openxmlformats.org/drawingml/2006/main" xmlns:r="http://schemas.openxmlformats.org/officeDocument/2006/relationships" xmlns:p="http://schemas.openxmlformats.org/presentationml/2006/main">
   <p:cSld>
     <p:spTree>
@@ -7650,7 +7821,7 @@
 </p:sld>
 </file>
 
-<file path=ppt/slides/slide12.xml><?xml version="1.0" encoding="utf-8"?>
+<file path=ppt/slides/slide13.xml><?xml version="1.0" encoding="utf-8"?>
 <p:sld xmlns:a="http://schemas.openxmlformats.org/drawingml/2006/main" xmlns:r="http://schemas.openxmlformats.org/officeDocument/2006/relationships" xmlns:p="http://schemas.openxmlformats.org/presentationml/2006/main">
   <p:cSld>
     <p:spTree>
@@ -8256,7 +8427,7 @@
 </p:sld>
 </file>
 
-<file path=ppt/slides/slide13.xml><?xml version="1.0" encoding="utf-8"?>
+<file path=ppt/slides/slide14.xml><?xml version="1.0" encoding="utf-8"?>
 <p:sld xmlns:a="http://schemas.openxmlformats.org/drawingml/2006/main" xmlns:r="http://schemas.openxmlformats.org/officeDocument/2006/relationships" xmlns:p="http://schemas.openxmlformats.org/presentationml/2006/main">
   <p:cSld>
     <p:spTree>
@@ -16088,6 +16259,66 @@
           <a:chExt cx="0" cy="0"/>
         </a:xfrm>
       </p:grpSpPr>
+      <p:pic>
+        <p:nvPicPr>
+          <p:cNvPr id="2" name="Picture 1">
+            <a:extLst>
+              <a:ext uri="{FF2B5EF4-FFF2-40B4-BE49-F238E27FC236}">
+                <a16:creationId xmlns:a16="http://schemas.microsoft.com/office/drawing/2014/main" id="{B10E5B94-CCB7-ABA5-EAA5-BC22387EEFFD}"/>
+              </a:ext>
+            </a:extLst>
+          </p:cNvPr>
+          <p:cNvPicPr>
+            <a:picLocks noChangeAspect="1"/>
+          </p:cNvPicPr>
+          <p:nvPr/>
+        </p:nvPicPr>
+        <p:blipFill>
+          <a:blip r:embed="rId2"/>
+          <a:stretch>
+            <a:fillRect/>
+          </a:stretch>
+        </p:blipFill>
+        <p:spPr>
+          <a:xfrm>
+            <a:off x="2209800" y="1316115"/>
+            <a:ext cx="7772400" cy="4225770"/>
+          </a:xfrm>
+          <a:prstGeom prst="rect">
+            <a:avLst/>
+          </a:prstGeom>
+        </p:spPr>
+      </p:pic>
+    </p:spTree>
+    <p:extLst>
+      <p:ext uri="{BB962C8B-B14F-4D97-AF65-F5344CB8AC3E}">
+        <p14:creationId xmlns:p14="http://schemas.microsoft.com/office/powerpoint/2010/main" val="1143809052"/>
+      </p:ext>
+    </p:extLst>
+  </p:cSld>
+  <p:clrMapOvr>
+    <a:masterClrMapping/>
+  </p:clrMapOvr>
+</p:sld>
+</file>
+
+<file path=ppt/slides/slide3.xml><?xml version="1.0" encoding="utf-8"?>
+<p:sld xmlns:a="http://schemas.openxmlformats.org/drawingml/2006/main" xmlns:r="http://schemas.openxmlformats.org/officeDocument/2006/relationships" xmlns:p="http://schemas.openxmlformats.org/presentationml/2006/main">
+  <p:cSld>
+    <p:spTree>
+      <p:nvGrpSpPr>
+        <p:cNvPr id="1" name=""/>
+        <p:cNvGrpSpPr/>
+        <p:nvPr/>
+      </p:nvGrpSpPr>
+      <p:grpSpPr>
+        <a:xfrm>
+          <a:off x="0" y="0"/>
+          <a:ext cx="0" cy="0"/>
+          <a:chOff x="0" y="0"/>
+          <a:chExt cx="0" cy="0"/>
+        </a:xfrm>
+      </p:grpSpPr>
       <p:grpSp>
         <p:nvGrpSpPr>
           <p:cNvPr id="40" name="Group 39">
@@ -18020,7 +18251,7 @@
 </p:sld>
 </file>
 
-<file path=ppt/slides/slide3.xml><?xml version="1.0" encoding="utf-8"?>
+<file path=ppt/slides/slide4.xml><?xml version="1.0" encoding="utf-8"?>
 <p:sld xmlns:a="http://schemas.openxmlformats.org/drawingml/2006/main" xmlns:r="http://schemas.openxmlformats.org/officeDocument/2006/relationships" xmlns:p="http://schemas.openxmlformats.org/presentationml/2006/main">
   <p:cSld>
     <p:spTree>
@@ -18106,7 +18337,7 @@
               <a:effectLst/>
               <a:extLst>
                 <a:ext uri="{AF507438-7753-43e0-B8FC-AC1667EBCBE1}">
-                  <a14:hiddenEffects xmlns:a14="http://schemas.microsoft.com/office/drawing/2010/main" xmlns="">
+                  <a14:hiddenEffects xmlns="" xmlns:a14="http://schemas.microsoft.com/office/drawing/2010/main">
                     <a:effectLst>
                       <a:outerShdw blurRad="63500" dist="38099" dir="2700000" algn="ctr" rotWithShape="0">
                         <a:schemeClr val="bg2">
@@ -18148,7 +18379,7 @@
               <a:effectLst/>
               <a:extLst>
                 <a:ext uri="{AF507438-7753-43e0-B8FC-AC1667EBCBE1}">
-                  <a14:hiddenEffects xmlns:a14="http://schemas.microsoft.com/office/drawing/2010/main" xmlns="">
+                  <a14:hiddenEffects xmlns="" xmlns:a14="http://schemas.microsoft.com/office/drawing/2010/main">
                     <a:effectLst>
                       <a:outerShdw blurRad="63500" dist="38099" dir="2700000" algn="ctr" rotWithShape="0">
                         <a:schemeClr val="bg2">
@@ -18190,7 +18421,7 @@
               <a:effectLst/>
               <a:extLst>
                 <a:ext uri="{AF507438-7753-43e0-B8FC-AC1667EBCBE1}">
-                  <a14:hiddenEffects xmlns:a14="http://schemas.microsoft.com/office/drawing/2010/main" xmlns="">
+                  <a14:hiddenEffects xmlns="" xmlns:a14="http://schemas.microsoft.com/office/drawing/2010/main">
                     <a:effectLst>
                       <a:outerShdw blurRad="63500" dist="38099" dir="2700000" algn="ctr" rotWithShape="0">
                         <a:schemeClr val="bg2">
@@ -18232,7 +18463,7 @@
               <a:effectLst/>
               <a:extLst>
                 <a:ext uri="{AF507438-7753-43e0-B8FC-AC1667EBCBE1}">
-                  <a14:hiddenEffects xmlns:a14="http://schemas.microsoft.com/office/drawing/2010/main" xmlns="">
+                  <a14:hiddenEffects xmlns="" xmlns:a14="http://schemas.microsoft.com/office/drawing/2010/main">
                     <a:effectLst>
                       <a:outerShdw blurRad="63500" dist="38099" dir="2700000" algn="ctr" rotWithShape="0">
                         <a:schemeClr val="bg2">
@@ -18245,8 +18476,8 @@
               </a:extLst>
             </p:spPr>
           </p:cxnSp>
-          <mc:AlternateContent xmlns:mc="http://schemas.openxmlformats.org/markup-compatibility/2006">
-            <mc:Choice xmlns:a14="http://schemas.microsoft.com/office/drawing/2010/main" Requires="a14">
+          <mc:AlternateContent xmlns:mc="http://schemas.openxmlformats.org/markup-compatibility/2006" xmlns:a14="http://schemas.microsoft.com/office/drawing/2010/main">
+            <mc:Choice Requires="a14">
               <p:sp>
                 <p:nvSpPr>
                   <p:cNvPr id="16" name="TextBox 15"/>
@@ -18329,7 +18560,7 @@
                 </p:txBody>
               </p:sp>
             </mc:Choice>
-            <mc:Fallback>
+            <mc:Fallback xmlns="">
               <p:sp>
                 <p:nvSpPr>
                   <p:cNvPr id="16" name="TextBox 15"/>
@@ -18402,8 +18633,8 @@
               </a:p>
             </p:txBody>
           </p:sp>
-          <mc:AlternateContent xmlns:mc="http://schemas.openxmlformats.org/markup-compatibility/2006">
-            <mc:Choice xmlns:a14="http://schemas.microsoft.com/office/drawing/2010/main" Requires="a14">
+          <mc:AlternateContent xmlns:mc="http://schemas.openxmlformats.org/markup-compatibility/2006" xmlns:a14="http://schemas.microsoft.com/office/drawing/2010/main">
+            <mc:Choice Requires="a14">
               <p:sp>
                 <p:nvSpPr>
                   <p:cNvPr id="20" name="TextBox 19"/>
@@ -18426,6 +18657,7 @@
                   </a:bodyPr>
                   <a:lstStyle/>
                   <a:p>
+                    <a:pPr/>
                     <a14:m>
                       <m:oMathPara xmlns:m="http://schemas.openxmlformats.org/officeDocument/2006/math">
                         <m:oMathParaPr>
@@ -18496,7 +18728,7 @@
                 </p:txBody>
               </p:sp>
             </mc:Choice>
-            <mc:Fallback>
+            <mc:Fallback xmlns="">
               <p:sp>
                 <p:nvSpPr>
                   <p:cNvPr id="20" name="TextBox 19"/>
@@ -18598,7 +18830,7 @@
               <a:effectLst/>
               <a:extLst>
                 <a:ext uri="{AF507438-7753-43e0-B8FC-AC1667EBCBE1}">
-                  <a14:hiddenEffects xmlns:a14="http://schemas.microsoft.com/office/drawing/2010/main" xmlns="">
+                  <a14:hiddenEffects xmlns="" xmlns:a14="http://schemas.microsoft.com/office/drawing/2010/main">
                     <a:effectLst>
                       <a:outerShdw blurRad="63500" dist="38099" dir="2700000" algn="ctr" rotWithShape="0">
                         <a:schemeClr val="bg2">
@@ -18611,8 +18843,8 @@
               </a:extLst>
             </p:spPr>
           </p:cxnSp>
-          <mc:AlternateContent xmlns:mc="http://schemas.openxmlformats.org/markup-compatibility/2006">
-            <mc:Choice xmlns:a14="http://schemas.microsoft.com/office/drawing/2010/main" Requires="a14">
+          <mc:AlternateContent xmlns:mc="http://schemas.openxmlformats.org/markup-compatibility/2006" xmlns:a14="http://schemas.microsoft.com/office/drawing/2010/main">
+            <mc:Choice Requires="a14">
               <p:sp>
                 <p:nvSpPr>
                   <p:cNvPr id="8" name="TextBox 7">
@@ -18641,6 +18873,7 @@
                   </a:bodyPr>
                   <a:lstStyle/>
                   <a:p>
+                    <a:pPr/>
                     <a14:m>
                       <m:oMathPara xmlns:m="http://schemas.openxmlformats.org/officeDocument/2006/math">
                         <m:oMathParaPr>
@@ -18693,7 +18926,7 @@
                 </p:txBody>
               </p:sp>
             </mc:Choice>
-            <mc:Fallback>
+            <mc:Fallback xmlns="">
               <p:sp>
                 <p:nvSpPr>
                   <p:cNvPr id="8" name="TextBox 7">
@@ -18985,7 +19218,7 @@
 </p:sld>
 </file>
 
-<file path=ppt/slides/slide4.xml><?xml version="1.0" encoding="utf-8"?>
+<file path=ppt/slides/slide5.xml><?xml version="1.0" encoding="utf-8"?>
 <p:sld xmlns:a="http://schemas.openxmlformats.org/drawingml/2006/main" xmlns:r="http://schemas.openxmlformats.org/officeDocument/2006/relationships" xmlns:p="http://schemas.openxmlformats.org/presentationml/2006/main">
   <p:cSld>
     <p:spTree>
@@ -19116,7 +19349,7 @@
 </p:sld>
 </file>
 
-<file path=ppt/slides/slide5.xml><?xml version="1.0" encoding="utf-8"?>
+<file path=ppt/slides/slide6.xml><?xml version="1.0" encoding="utf-8"?>
 <p:sld xmlns:a="http://schemas.openxmlformats.org/drawingml/2006/main" xmlns:r="http://schemas.openxmlformats.org/officeDocument/2006/relationships" xmlns:p="http://schemas.openxmlformats.org/presentationml/2006/main">
   <p:cSld>
     <p:spTree>
@@ -21381,14 +21614,14 @@
           <a:effectLst/>
           <a:extLst>
             <a:ext uri="{909E8E84-426E-40dd-AFC4-6F175D3DCCD1}">
-              <a14:hiddenFill xmlns:a14="http://schemas.microsoft.com/office/drawing/2010/main" xmlns="">
+              <a14:hiddenFill xmlns="" xmlns:a14="http://schemas.microsoft.com/office/drawing/2010/main">
                 <a:solidFill>
                   <a:schemeClr val="accent1"/>
                 </a:solidFill>
               </a14:hiddenFill>
             </a:ext>
             <a:ext uri="{91240B29-F687-4f45-9708-019B960494DF}">
-              <a14:hiddenLine xmlns:a14="http://schemas.microsoft.com/office/drawing/2010/main" xmlns="" w="9525">
+              <a14:hiddenLine xmlns="" xmlns:a14="http://schemas.microsoft.com/office/drawing/2010/main" w="9525">
                 <a:solidFill>
                   <a:schemeClr val="tx1"/>
                 </a:solidFill>
@@ -21398,7 +21631,7 @@
               </a14:hiddenLine>
             </a:ext>
             <a:ext uri="{AF507438-7753-43e0-B8FC-AC1667EBCBE1}">
-              <a14:hiddenEffects xmlns:a14="http://schemas.microsoft.com/office/drawing/2010/main" xmlns="">
+              <a14:hiddenEffects xmlns="" xmlns:a14="http://schemas.microsoft.com/office/drawing/2010/main">
                 <a:effectLst>
                   <a:outerShdw blurRad="63500" dist="38099" dir="2700000" algn="ctr" rotWithShape="0">
                     <a:schemeClr val="bg2">
@@ -21409,7 +21642,7 @@
               </a14:hiddenEffects>
             </a:ext>
             <a:ext uri="{FAA26D3D-D897-4be2-8F04-BA451C77F1D7}">
-              <ma14:placeholderFlag xmlns:ma14="http://schemas.microsoft.com/office/mac/drawingml/2011/main" xmlns="" val="1"/>
+              <ma14:placeholderFlag xmlns="" xmlns:ma14="http://schemas.microsoft.com/office/mac/drawingml/2011/main" val="1"/>
             </a:ext>
           </a:extLst>
         </p:spPr>
@@ -23126,7 +23359,7 @@
 </p:sld>
 </file>
 
-<file path=ppt/slides/slide6.xml><?xml version="1.0" encoding="utf-8"?>
+<file path=ppt/slides/slide7.xml><?xml version="1.0" encoding="utf-8"?>
 <p:sld xmlns:a="http://schemas.openxmlformats.org/drawingml/2006/main" xmlns:r="http://schemas.openxmlformats.org/officeDocument/2006/relationships" xmlns:p="http://schemas.openxmlformats.org/presentationml/2006/main">
   <p:cSld>
     <p:spTree>
@@ -26429,7 +26662,7 @@
 </p:sld>
 </file>
 
-<file path=ppt/slides/slide7.xml><?xml version="1.0" encoding="utf-8"?>
+<file path=ppt/slides/slide8.xml><?xml version="1.0" encoding="utf-8"?>
 <p:sld xmlns:a="http://schemas.openxmlformats.org/drawingml/2006/main" xmlns:r="http://schemas.openxmlformats.org/officeDocument/2006/relationships" xmlns:p="http://schemas.openxmlformats.org/presentationml/2006/main">
   <p:cSld>
     <p:spTree>
@@ -29962,7 +30195,7 @@
 </p:sld>
 </file>
 
-<file path=ppt/slides/slide8.xml><?xml version="1.0" encoding="utf-8"?>
+<file path=ppt/slides/slide9.xml><?xml version="1.0" encoding="utf-8"?>
 <p:sld xmlns:a="http://schemas.openxmlformats.org/drawingml/2006/main" xmlns:r="http://schemas.openxmlformats.org/officeDocument/2006/relationships" xmlns:p="http://schemas.openxmlformats.org/presentationml/2006/main">
   <p:cSld>
     <p:spTree>
@@ -33705,171 +33938,6 @@
   <p:clrMapOvr>
     <a:masterClrMapping/>
   </p:clrMapOvr>
-</p:sld>
-</file>
-
-<file path=ppt/slides/slide9.xml><?xml version="1.0" encoding="utf-8"?>
-<p:sld xmlns:a="http://schemas.openxmlformats.org/drawingml/2006/main" xmlns:r="http://schemas.openxmlformats.org/officeDocument/2006/relationships" xmlns:p="http://schemas.openxmlformats.org/presentationml/2006/main">
-  <p:cSld>
-    <p:spTree>
-      <p:nvGrpSpPr>
-        <p:cNvPr id="1" name=""/>
-        <p:cNvGrpSpPr/>
-        <p:nvPr/>
-      </p:nvGrpSpPr>
-      <p:grpSpPr>
-        <a:xfrm>
-          <a:off x="0" y="0"/>
-          <a:ext cx="0" cy="0"/>
-          <a:chOff x="0" y="0"/>
-          <a:chExt cx="0" cy="0"/>
-        </a:xfrm>
-      </p:grpSpPr>
-      <p:pic>
-        <p:nvPicPr>
-          <p:cNvPr id="9" name="Content Placeholder 4">
-            <a:extLst>
-              <a:ext uri="{FF2B5EF4-FFF2-40B4-BE49-F238E27FC236}">
-                <a16:creationId xmlns:a16="http://schemas.microsoft.com/office/drawing/2014/main" id="{425FDEC1-07CA-BF8A-A271-DC071567B813}"/>
-              </a:ext>
-            </a:extLst>
-          </p:cNvPr>
-          <p:cNvPicPr>
-            <a:picLocks noChangeAspect="1"/>
-          </p:cNvPicPr>
-          <p:nvPr/>
-        </p:nvPicPr>
-        <p:blipFill>
-          <a:blip r:embed="rId2"/>
-          <a:stretch>
-            <a:fillRect/>
-          </a:stretch>
-        </p:blipFill>
-        <p:spPr>
-          <a:xfrm>
-            <a:off x="354475" y="2003337"/>
-            <a:ext cx="8443913" cy="1513349"/>
-          </a:xfrm>
-          <a:prstGeom prst="rect">
-            <a:avLst/>
-          </a:prstGeom>
-        </p:spPr>
-      </p:pic>
-      <p:pic>
-        <p:nvPicPr>
-          <p:cNvPr id="10" name="Picture 9">
-            <a:extLst>
-              <a:ext uri="{FF2B5EF4-FFF2-40B4-BE49-F238E27FC236}">
-                <a16:creationId xmlns:a16="http://schemas.microsoft.com/office/drawing/2014/main" id="{1E5E64E8-776A-ECE5-6A99-7A0C8670546E}"/>
-              </a:ext>
-            </a:extLst>
-          </p:cNvPr>
-          <p:cNvPicPr>
-            <a:picLocks noChangeAspect="1"/>
-          </p:cNvPicPr>
-          <p:nvPr/>
-        </p:nvPicPr>
-        <p:blipFill>
-          <a:blip r:embed="rId3"/>
-          <a:stretch>
-            <a:fillRect/>
-          </a:stretch>
-        </p:blipFill>
-        <p:spPr>
-          <a:xfrm>
-            <a:off x="354475" y="3817441"/>
-            <a:ext cx="5224522" cy="1515756"/>
-          </a:xfrm>
-          <a:prstGeom prst="rect">
-            <a:avLst/>
-          </a:prstGeom>
-        </p:spPr>
-      </p:pic>
-    </p:spTree>
-    <p:extLst>
-      <p:ext uri="{BB962C8B-B14F-4D97-AF65-F5344CB8AC3E}">
-        <p14:creationId xmlns:p14="http://schemas.microsoft.com/office/powerpoint/2010/main" val="3383201513"/>
-      </p:ext>
-    </p:extLst>
-  </p:cSld>
-  <p:clrMapOvr>
-    <a:masterClrMapping/>
-  </p:clrMapOvr>
-  <p:timing>
-    <p:tnLst>
-      <p:par>
-        <p:cTn id="1" dur="indefinite" restart="never" nodeType="tmRoot">
-          <p:childTnLst>
-            <p:seq concurrent="1" nextAc="seek">
-              <p:cTn id="2" dur="indefinite" nodeType="mainSeq">
-                <p:childTnLst>
-                  <p:par>
-                    <p:cTn id="3" fill="hold">
-                      <p:stCondLst>
-                        <p:cond delay="indefinite"/>
-                      </p:stCondLst>
-                      <p:childTnLst>
-                        <p:par>
-                          <p:cTn id="4" fill="hold">
-                            <p:stCondLst>
-                              <p:cond delay="0"/>
-                            </p:stCondLst>
-                            <p:childTnLst>
-                              <p:par>
-                                <p:cTn id="5" presetID="1" presetClass="entr" presetSubtype="0" fill="hold" nodeType="clickEffect">
-                                  <p:stCondLst>
-                                    <p:cond delay="0"/>
-                                  </p:stCondLst>
-                                  <p:childTnLst>
-                                    <p:set>
-                                      <p:cBhvr>
-                                        <p:cTn id="6" dur="1" fill="hold">
-                                          <p:stCondLst>
-                                            <p:cond delay="0"/>
-                                          </p:stCondLst>
-                                        </p:cTn>
-                                        <p:tgtEl>
-                                          <p:spTgt spid="10"/>
-                                        </p:tgtEl>
-                                        <p:attrNameLst>
-                                          <p:attrName>style.visibility</p:attrName>
-                                        </p:attrNameLst>
-                                      </p:cBhvr>
-                                      <p:to>
-                                        <p:strVal val="visible"/>
-                                      </p:to>
-                                    </p:set>
-                                  </p:childTnLst>
-                                </p:cTn>
-                              </p:par>
-                            </p:childTnLst>
-                          </p:cTn>
-                        </p:par>
-                      </p:childTnLst>
-                    </p:cTn>
-                  </p:par>
-                </p:childTnLst>
-              </p:cTn>
-              <p:prevCondLst>
-                <p:cond evt="onPrev" delay="0">
-                  <p:tgtEl>
-                    <p:sldTgt/>
-                  </p:tgtEl>
-                </p:cond>
-              </p:prevCondLst>
-              <p:nextCondLst>
-                <p:cond evt="onNext" delay="0">
-                  <p:tgtEl>
-                    <p:sldTgt/>
-                  </p:tgtEl>
-                </p:cond>
-              </p:nextCondLst>
-            </p:seq>
-          </p:childTnLst>
-        </p:cTn>
-      </p:par>
-    </p:tnLst>
-  </p:timing>
 </p:sld>
 </file>
 

</xml_diff>